<commit_message>
Update IoT final presentation.pptx
</commit_message>
<xml_diff>
--- a/IoT final presentation.pptx
+++ b/IoT final presentation.pptx
@@ -1916,7 +1916,7 @@
           </a:br>
           <a:r>
             <a:rPr lang="en-US" dirty="0"/>
-            <a:t>Interne</a:t>
+            <a:t>Internet</a:t>
           </a:r>
           <a:endParaRPr lang="de-DE" dirty="0"/>
         </a:p>
@@ -3265,7 +3265,7 @@
           </a:br>
           <a:r>
             <a:rPr lang="en-US" sz="1800" kern="1200" dirty="0"/>
-            <a:t>Interne</a:t>
+            <a:t>Internet</a:t>
           </a:r>
           <a:endParaRPr lang="de-DE" sz="1800" kern="1200" dirty="0"/>
         </a:p>
@@ -16199,15 +16199,7 @@
           <a:p>
             <a:r>
               <a:rPr lang="en-US" b="0" i="1" dirty="0"/>
-              <a:t>What existing solutions in research are using the Internet of Things </a:t>
-            </a:r>
-            <a:r>
-              <a:rPr lang="en-US" b="0" i="1" dirty="0" err="1"/>
-              <a:t>technologie</a:t>
-            </a:r>
-            <a:r>
-              <a:rPr lang="en-US" b="0" i="1" dirty="0"/>
-              <a:t> in supply chains to</a:t>
+              <a:t>What existing solutions in research are using the Internet of Things technology in supply chains to</a:t>
             </a:r>
           </a:p>
           <a:p>
@@ -18862,7 +18854,7 @@
             </a:pPr>
             <a:r>
               <a:rPr lang="en-US" b="0" dirty="0"/>
-              <a:t>companies are struggling to decarbonize their supply chains and achieve net-zero emission</a:t>
+              <a:t>companies are struggling to decarbonize their supply chains and achieve net-zero emissions</a:t>
             </a:r>
           </a:p>
           <a:p>
@@ -19124,7 +19116,7 @@
           <p:nvPr>
             <p:extLst>
               <p:ext uri="{D42A27DB-BD31-4B8C-83A1-F6EECF244321}">
-                <p14:modId xmlns:p14="http://schemas.microsoft.com/office/powerpoint/2010/main" val="1808438685"/>
+                <p14:modId xmlns:p14="http://schemas.microsoft.com/office/powerpoint/2010/main" val="2472689602"/>
               </p:ext>
             </p:extLst>
           </p:nvPr>

</xml_diff>